<commit_message>
Modificacion del titulo de diapositivas
</commit_message>
<xml_diff>
--- a/3capas/Cliente servidor - tres capas.pptx
+++ b/3capas/Cliente servidor - tres capas.pptx
@@ -312,7 +312,7 @@
           <a:p>
             <a:fld id="{900BD5CF-029C-41C3-A9EB-74AFAD7F0574}" type="datetimeFigureOut">
               <a:rPr lang="es-EC" smtClean="0"/>
-              <a:t>07/06/2015</a:t>
+              <a:t>19/07/2015</a:t>
             </a:fld>
             <a:endParaRPr lang="es-EC"/>
           </a:p>
@@ -650,7 +650,7 @@
           <a:p>
             <a:fld id="{900BD5CF-029C-41C3-A9EB-74AFAD7F0574}" type="datetimeFigureOut">
               <a:rPr lang="es-EC" smtClean="0"/>
-              <a:t>07/06/2015</a:t>
+              <a:t>19/07/2015</a:t>
             </a:fld>
             <a:endParaRPr lang="es-EC"/>
           </a:p>
@@ -1051,7 +1051,7 @@
           <a:p>
             <a:fld id="{900BD5CF-029C-41C3-A9EB-74AFAD7F0574}" type="datetimeFigureOut">
               <a:rPr lang="es-EC" smtClean="0"/>
-              <a:t>07/06/2015</a:t>
+              <a:t>19/07/2015</a:t>
             </a:fld>
             <a:endParaRPr lang="es-EC"/>
           </a:p>
@@ -1387,7 +1387,7 @@
           <a:p>
             <a:fld id="{900BD5CF-029C-41C3-A9EB-74AFAD7F0574}" type="datetimeFigureOut">
               <a:rPr lang="es-EC" smtClean="0"/>
-              <a:t>07/06/2015</a:t>
+              <a:t>19/07/2015</a:t>
             </a:fld>
             <a:endParaRPr lang="es-EC"/>
           </a:p>
@@ -1707,7 +1707,7 @@
           <a:p>
             <a:fld id="{900BD5CF-029C-41C3-A9EB-74AFAD7F0574}" type="datetimeFigureOut">
               <a:rPr lang="es-EC" smtClean="0"/>
-              <a:t>07/06/2015</a:t>
+              <a:t>19/07/2015</a:t>
             </a:fld>
             <a:endParaRPr lang="es-EC"/>
           </a:p>
@@ -2103,7 +2103,7 @@
           <a:p>
             <a:fld id="{900BD5CF-029C-41C3-A9EB-74AFAD7F0574}" type="datetimeFigureOut">
               <a:rPr lang="es-EC" smtClean="0"/>
-              <a:t>07/06/2015</a:t>
+              <a:t>19/07/2015</a:t>
             </a:fld>
             <a:endParaRPr lang="es-EC"/>
           </a:p>
@@ -2360,7 +2360,7 @@
           <a:p>
             <a:fld id="{900BD5CF-029C-41C3-A9EB-74AFAD7F0574}" type="datetimeFigureOut">
               <a:rPr lang="es-EC" smtClean="0"/>
-              <a:t>07/06/2015</a:t>
+              <a:t>19/07/2015</a:t>
             </a:fld>
             <a:endParaRPr lang="es-EC"/>
           </a:p>
@@ -2622,7 +2622,7 @@
           <a:p>
             <a:fld id="{900BD5CF-029C-41C3-A9EB-74AFAD7F0574}" type="datetimeFigureOut">
               <a:rPr lang="es-EC" smtClean="0"/>
-              <a:t>07/06/2015</a:t>
+              <a:t>19/07/2015</a:t>
             </a:fld>
             <a:endParaRPr lang="es-EC"/>
           </a:p>
@@ -2884,7 +2884,7 @@
           <a:p>
             <a:fld id="{900BD5CF-029C-41C3-A9EB-74AFAD7F0574}" type="datetimeFigureOut">
               <a:rPr lang="es-EC" smtClean="0"/>
-              <a:t>07/06/2015</a:t>
+              <a:t>19/07/2015</a:t>
             </a:fld>
             <a:endParaRPr lang="es-EC"/>
           </a:p>
@@ -3213,7 +3213,7 @@
           <a:p>
             <a:fld id="{900BD5CF-029C-41C3-A9EB-74AFAD7F0574}" type="datetimeFigureOut">
               <a:rPr lang="es-EC" smtClean="0"/>
-              <a:t>07/06/2015</a:t>
+              <a:t>19/07/2015</a:t>
             </a:fld>
             <a:endParaRPr lang="es-EC"/>
           </a:p>
@@ -3536,7 +3536,7 @@
           <a:p>
             <a:fld id="{900BD5CF-029C-41C3-A9EB-74AFAD7F0574}" type="datetimeFigureOut">
               <a:rPr lang="es-EC" smtClean="0"/>
-              <a:t>07/06/2015</a:t>
+              <a:t>19/07/2015</a:t>
             </a:fld>
             <a:endParaRPr lang="es-EC"/>
           </a:p>
@@ -3993,7 +3993,7 @@
           <a:p>
             <a:fld id="{900BD5CF-029C-41C3-A9EB-74AFAD7F0574}" type="datetimeFigureOut">
               <a:rPr lang="es-EC" smtClean="0"/>
-              <a:t>07/06/2015</a:t>
+              <a:t>19/07/2015</a:t>
             </a:fld>
             <a:endParaRPr lang="es-EC"/>
           </a:p>
@@ -4198,7 +4198,7 @@
           <a:p>
             <a:fld id="{900BD5CF-029C-41C3-A9EB-74AFAD7F0574}" type="datetimeFigureOut">
               <a:rPr lang="es-EC" smtClean="0"/>
-              <a:t>07/06/2015</a:t>
+              <a:t>19/07/2015</a:t>
             </a:fld>
             <a:endParaRPr lang="es-EC"/>
           </a:p>
@@ -4375,7 +4375,7 @@
           <a:p>
             <a:fld id="{900BD5CF-029C-41C3-A9EB-74AFAD7F0574}" type="datetimeFigureOut">
               <a:rPr lang="es-EC" smtClean="0"/>
-              <a:t>07/06/2015</a:t>
+              <a:t>19/07/2015</a:t>
             </a:fld>
             <a:endParaRPr lang="es-EC"/>
           </a:p>
@@ -4708,7 +4708,7 @@
           <a:p>
             <a:fld id="{900BD5CF-029C-41C3-A9EB-74AFAD7F0574}" type="datetimeFigureOut">
               <a:rPr lang="es-EC" smtClean="0"/>
-              <a:t>07/06/2015</a:t>
+              <a:t>19/07/2015</a:t>
             </a:fld>
             <a:endParaRPr lang="es-EC"/>
           </a:p>
@@ -5053,7 +5053,7 @@
           <a:p>
             <a:fld id="{900BD5CF-029C-41C3-A9EB-74AFAD7F0574}" type="datetimeFigureOut">
               <a:rPr lang="es-EC" smtClean="0"/>
-              <a:t>07/06/2015</a:t>
+              <a:t>19/07/2015</a:t>
             </a:fld>
             <a:endParaRPr lang="es-EC"/>
           </a:p>
@@ -7170,7 +7170,7 @@
           <a:p>
             <a:fld id="{900BD5CF-029C-41C3-A9EB-74AFAD7F0574}" type="datetimeFigureOut">
               <a:rPr lang="es-EC" smtClean="0"/>
-              <a:t>07/06/2015</a:t>
+              <a:t>19/07/2015</a:t>
             </a:fld>
             <a:endParaRPr lang="es-EC"/>
           </a:p>
@@ -7712,19 +7712,12 @@
           <a:p>
             <a:pPr algn="ctr"/>
             <a:r>
+              <a:rPr lang="es-EC" sz="4000" smtClean="0"/>
+              <a:t>Cliente-servidor </a:t>
+            </a:r>
+            <a:r>
               <a:rPr lang="es-EC" sz="4000" dirty="0" smtClean="0"/>
-              <a:t>Arquitectura</a:t>
-            </a:r>
-            <a:br>
-              <a:rPr lang="es-EC" sz="4000" dirty="0" smtClean="0"/>
-            </a:br>
-            <a:r>
-              <a:rPr lang="es-EC" sz="4000" dirty="0" smtClean="0"/>
-              <a:t>Cliente-servidor / Tres </a:t>
-            </a:r>
-            <a:r>
-              <a:rPr lang="es-EC" sz="4000" dirty="0" smtClean="0"/>
-              <a:t>Capas </a:t>
+              <a:t>/ Tres Capas </a:t>
             </a:r>
             <a:endParaRPr lang="es-EC" sz="4000" dirty="0"/>
           </a:p>
@@ -7794,15 +7787,7 @@
                   <a:schemeClr val="tx1"/>
                 </a:solidFill>
               </a:rPr>
-              <a:t> </a:t>
-            </a:r>
-            <a:r>
-              <a:rPr lang="es-EC" sz="2800" dirty="0" smtClean="0">
-                <a:solidFill>
-                  <a:schemeClr val="tx1"/>
-                </a:solidFill>
-              </a:rPr>
-              <a:t>Loján </a:t>
+              <a:t> Loján </a:t>
             </a:r>
             <a:endParaRPr lang="es-EC" sz="2800" dirty="0">
               <a:solidFill>
@@ -9978,16 +9963,7 @@
                   <a:schemeClr val="accent4"/>
                 </a:solidFill>
               </a:rPr>
-              <a:t>Modelo de vistas 4+1</a:t>
-            </a:r>
-            <a:r>
-              <a:rPr lang="es-ES" sz="2800" b="1" dirty="0" smtClean="0">
-                <a:ln/>
-                <a:solidFill>
-                  <a:schemeClr val="accent4"/>
-                </a:solidFill>
-              </a:rPr>
-              <a:t>:</a:t>
+              <a:t>Modelo de vistas 4+1:</a:t>
             </a:r>
             <a:endParaRPr lang="es-ES" sz="2800" b="1" cap="none" spc="0" dirty="0">
               <a:ln/>
@@ -10649,13 +10625,13 @@
   <p:clrMapOvr>
     <a:masterClrMapping/>
   </p:clrMapOvr>
-  <mc:AlternateContent xmlns:mc="http://schemas.openxmlformats.org/markup-compatibility/2006">
-    <mc:Choice xmlns:p14="http://schemas.microsoft.com/office/powerpoint/2010/main" Requires="p14">
+  <mc:AlternateContent xmlns:mc="http://schemas.openxmlformats.org/markup-compatibility/2006" xmlns:p14="http://schemas.microsoft.com/office/powerpoint/2010/main">
+    <mc:Choice Requires="p14">
       <p:transition spd="slow" p14:dur="1200">
         <p14:prism/>
       </p:transition>
     </mc:Choice>
-    <mc:Fallback>
+    <mc:Fallback xmlns="">
       <p:transition spd="slow">
         <p:fade/>
       </p:transition>
@@ -11574,11 +11550,7 @@
             </a:pPr>
             <a:r>
               <a:rPr lang="es-ES" dirty="0" smtClean="0"/>
-              <a:t>Diagrama </a:t>
-            </a:r>
-            <a:r>
-              <a:rPr lang="es-ES" dirty="0" smtClean="0"/>
-              <a:t>de</a:t>
+              <a:t>Diagrama de</a:t>
             </a:r>
           </a:p>
           <a:p>
@@ -11587,11 +11559,7 @@
             </a:pPr>
             <a:r>
               <a:rPr lang="es-ES" dirty="0" smtClean="0"/>
-              <a:t> </a:t>
-            </a:r>
-            <a:r>
-              <a:rPr lang="es-ES" dirty="0" smtClean="0"/>
-              <a:t>Actividades </a:t>
+              <a:t> Actividades </a:t>
             </a:r>
             <a:endParaRPr lang="es-EC" dirty="0"/>
           </a:p>
@@ -13579,13 +13547,13 @@
   <p:clrMapOvr>
     <a:masterClrMapping/>
   </p:clrMapOvr>
-  <mc:AlternateContent xmlns:mc="http://schemas.openxmlformats.org/markup-compatibility/2006">
-    <mc:Choice xmlns:p14="http://schemas.microsoft.com/office/powerpoint/2010/main" Requires="p14">
+  <mc:AlternateContent xmlns:mc="http://schemas.openxmlformats.org/markup-compatibility/2006" xmlns:p14="http://schemas.microsoft.com/office/powerpoint/2010/main">
+    <mc:Choice Requires="p14">
       <p:transition spd="slow" p14:dur="1200">
         <p14:prism/>
       </p:transition>
     </mc:Choice>
-    <mc:Fallback>
+    <mc:Fallback xmlns="">
       <p:transition spd="slow">
         <p:fade/>
       </p:transition>

</xml_diff>